<commit_message>
update screenshot in the ppt
</commit_message>
<xml_diff>
--- a/Modeling latency in a communication network.pptx
+++ b/Modeling latency in a communication network.pptx
@@ -11485,7 +11485,7 @@
           <a:p>
             <a:fld id="{6AD6EE87-EBD5-4F12-A48A-63ACA297AC8F}" type="datetimeFigureOut">
               <a:rPr lang="en-US" dirty="0"/>
-              <a:t>5/8/2018</a:t>
+              <a:t>5/9/2018</a:t>
             </a:fld>
             <a:endParaRPr lang="en-US" dirty="0"/>
           </a:p>
@@ -11687,7 +11687,7 @@
           <a:p>
             <a:fld id="{4CD73815-2707-4475-8F1A-B873CB631BB4}" type="datetimeFigureOut">
               <a:rPr lang="en-US" dirty="0"/>
-              <a:t>5/8/2018</a:t>
+              <a:t>5/9/2018</a:t>
             </a:fld>
             <a:endParaRPr lang="en-US" dirty="0"/>
           </a:p>
@@ -11862,7 +11862,7 @@
           <a:p>
             <a:fld id="{2A4AFB99-0EAB-4182-AFF8-E214C82A68F6}" type="datetimeFigureOut">
               <a:rPr lang="en-US" dirty="0"/>
-              <a:t>5/8/2018</a:t>
+              <a:t>5/9/2018</a:t>
             </a:fld>
             <a:endParaRPr lang="en-US" dirty="0"/>
           </a:p>
@@ -12062,7 +12062,7 @@
           <a:p>
             <a:fld id="{A5D3794B-289A-4A80-97D7-111025398D45}" type="datetimeFigureOut">
               <a:rPr lang="en-US" dirty="0"/>
-              <a:t>5/8/2018</a:t>
+              <a:t>5/9/2018</a:t>
             </a:fld>
             <a:endParaRPr lang="en-US" dirty="0"/>
           </a:p>
@@ -20955,7 +20955,7 @@
           <a:p>
             <a:fld id="{5A61015F-7CC6-4D0A-9D87-873EA4C304CC}" type="datetimeFigureOut">
               <a:rPr lang="en-US" dirty="0"/>
-              <a:t>5/8/2018</a:t>
+              <a:t>5/9/2018</a:t>
             </a:fld>
             <a:endParaRPr lang="en-US" dirty="0"/>
           </a:p>
@@ -21224,7 +21224,7 @@
           <a:p>
             <a:fld id="{93C6A301-0538-44EC-B09D-202E1042A48B}" type="datetimeFigureOut">
               <a:rPr lang="en-US" dirty="0"/>
-              <a:t>5/8/2018</a:t>
+              <a:t>5/9/2018</a:t>
             </a:fld>
             <a:endParaRPr lang="en-US" dirty="0"/>
           </a:p>
@@ -21617,7 +21617,7 @@
           <a:p>
             <a:fld id="{D789574A-8875-45EF-8EA2-3CAA0F7ABC4C}" type="datetimeFigureOut">
               <a:rPr lang="en-US" dirty="0"/>
-              <a:t>5/8/2018</a:t>
+              <a:t>5/9/2018</a:t>
             </a:fld>
             <a:endParaRPr lang="en-US" dirty="0"/>
           </a:p>
@@ -21730,7 +21730,7 @@
           <a:p>
             <a:fld id="{67EF4D4C-5367-4C26-9E2B-D8088D7FCA81}" type="datetimeFigureOut">
               <a:rPr lang="en-US" dirty="0"/>
-              <a:t>5/8/2018</a:t>
+              <a:t>5/9/2018</a:t>
             </a:fld>
             <a:endParaRPr lang="en-US" dirty="0"/>
           </a:p>
@@ -21820,7 +21820,7 @@
           <a:p>
             <a:fld id="{56E91E96-98B0-4413-9547-46F3504108EF}" type="datetimeFigureOut">
               <a:rPr lang="en-US" dirty="0"/>
-              <a:t>5/8/2018</a:t>
+              <a:t>5/9/2018</a:t>
             </a:fld>
             <a:endParaRPr lang="en-US" dirty="0"/>
           </a:p>
@@ -22105,7 +22105,7 @@
           <a:p>
             <a:fld id="{05C68B11-C5A8-448C-8CE9-B1A273C79CFC}" type="datetimeFigureOut">
               <a:rPr lang="en-US" dirty="0"/>
-              <a:t>5/8/2018</a:t>
+              <a:t>5/9/2018</a:t>
             </a:fld>
             <a:endParaRPr lang="en-US" dirty="0"/>
           </a:p>
@@ -22380,7 +22380,7 @@
           <a:p>
             <a:fld id="{C7616CA0-919D-4A49-9C8A-62FDFB3A5183}" type="datetimeFigureOut">
               <a:rPr lang="en-US" dirty="0"/>
-              <a:t>5/8/2018</a:t>
+              <a:t>5/9/2018</a:t>
             </a:fld>
             <a:endParaRPr lang="en-US" dirty="0"/>
           </a:p>
@@ -22626,7 +22626,7 @@
             <a:fld id="{90298CD5-6C1E-4009-B41F-6DF62E31D3BE}" type="datetimeFigureOut">
               <a:rPr lang="en-US" dirty="0"/>
               <a:pPr/>
-              <a:t>5/8/2018</a:t>
+              <a:t>5/9/2018</a:t>
             </a:fld>
             <a:endParaRPr lang="en-US" dirty="0"/>
           </a:p>
@@ -23622,7 +23622,6 @@
               <a:rPr lang="en-US" dirty="0" smtClean="0"/>
               <a:t>Methods</a:t>
             </a:r>
-            <a:endParaRPr lang="en-US" dirty="0" smtClean="0"/>
           </a:p>
           <a:p>
             <a:pPr lvl="1"/>
@@ -23630,14 +23629,12 @@
               <a:rPr lang="en-US" dirty="0" smtClean="0"/>
               <a:t>Flat prior, Gibbs Sampler</a:t>
             </a:r>
-            <a:endParaRPr lang="en-US" dirty="0" smtClean="0"/>
           </a:p>
           <a:p>
             <a:r>
               <a:rPr lang="en-US" dirty="0" smtClean="0"/>
               <a:t>Results</a:t>
             </a:r>
-            <a:endParaRPr lang="en-US" dirty="0" smtClean="0"/>
           </a:p>
           <a:p>
             <a:pPr lvl="1"/>
@@ -23807,11 +23804,7 @@
             </a:pPr>
             <a:r>
               <a:rPr lang="en-US" dirty="0" smtClean="0"/>
-              <a:t>Model 1: used a</a:t>
-            </a:r>
-            <a:r>
-              <a:rPr lang="en-US" dirty="0" smtClean="0"/>
-              <a:t> flat prior</a:t>
+              <a:t>Model 1: used a flat prior</a:t>
             </a:r>
           </a:p>
           <a:p>
@@ -23821,19 +23814,7 @@
             </a:pPr>
             <a:r>
               <a:rPr lang="en-US" dirty="0" smtClean="0"/>
-              <a:t>Model 2:</a:t>
-            </a:r>
-            <a:r>
-              <a:rPr lang="en-US" dirty="0" smtClean="0"/>
-              <a:t> </a:t>
-            </a:r>
-            <a:r>
-              <a:rPr lang="en-US" dirty="0" smtClean="0"/>
-              <a:t>as a hierarchical model </a:t>
-            </a:r>
-            <a:r>
-              <a:rPr lang="en-US" dirty="0" smtClean="0"/>
-              <a:t>with (Gamma) conjugate and hyper parameter using Gibbs sampler</a:t>
+              <a:t>Model 2: as a hierarchical model with (Gamma) conjugate and hyper parameter using Gibbs sampler</a:t>
             </a:r>
           </a:p>
           <a:p>
@@ -24000,11 +23981,7 @@
             <a:pPr lvl="1"/>
             <a:r>
               <a:rPr lang="en-US" dirty="0" smtClean="0"/>
-              <a:t>During peak network congestion, sometimes RTT could </a:t>
-            </a:r>
-            <a:r>
-              <a:rPr lang="en-US" dirty="0" smtClean="0"/>
-              <a:t>go </a:t>
+              <a:t>During peak network congestion, sometimes RTT could go </a:t>
             </a:r>
             <a:r>
               <a:rPr lang="en-US" dirty="0" err="1" smtClean="0"/>
@@ -24012,11 +23989,7 @@
             </a:r>
             <a:r>
               <a:rPr lang="en-US" dirty="0" smtClean="0"/>
-              <a:t> 15 to 20s which explains the </a:t>
-            </a:r>
-            <a:r>
-              <a:rPr lang="en-US" dirty="0" smtClean="0"/>
-              <a:t>long tailed distribution</a:t>
+              <a:t> 15 to 20s which explains the long tailed distribution</a:t>
             </a:r>
           </a:p>
         </p:txBody>
@@ -24234,15 +24207,7 @@
           <a:p>
             <a:r>
               <a:rPr lang="en-US" dirty="0" smtClean="0"/>
-              <a:t>Methods </a:t>
-            </a:r>
-            <a:r>
-              <a:rPr lang="en-US" dirty="0" smtClean="0"/>
-              <a:t>(contd</a:t>
-            </a:r>
-            <a:r>
-              <a:rPr lang="en-US" dirty="0" smtClean="0"/>
-              <a:t>.)</a:t>
+              <a:t>Methods (contd.)</a:t>
             </a:r>
             <a:endParaRPr lang="en-US" dirty="0"/>
           </a:p>
@@ -24479,15 +24444,7 @@
           <a:p>
             <a:r>
               <a:rPr lang="en-US" dirty="0" smtClean="0"/>
-              <a:t>Methods </a:t>
-            </a:r>
-            <a:r>
-              <a:rPr lang="en-US" dirty="0" smtClean="0"/>
-              <a:t>(contd</a:t>
-            </a:r>
-            <a:r>
-              <a:rPr lang="en-US" dirty="0" smtClean="0"/>
-              <a:t>.)</a:t>
+              <a:t>Methods (contd.)</a:t>
             </a:r>
             <a:endParaRPr lang="en-US" dirty="0"/>
           </a:p>
@@ -24732,7 +24689,6 @@
               <a:rPr lang="en-US" dirty="0" smtClean="0"/>
               <a:t>Comparison of theta under both models</a:t>
             </a:r>
-            <a:endParaRPr lang="en-US" dirty="0" smtClean="0"/>
           </a:p>
           <a:p>
             <a:endParaRPr lang="en-US" dirty="0" smtClean="0"/>
@@ -24889,7 +24845,6 @@
               <a:rPr lang="en-US" dirty="0" smtClean="0"/>
               <a:t>Both models almost equivalent in terms of test statistics falling within 95% credible interval</a:t>
             </a:r>
-            <a:endParaRPr lang="en-US" dirty="0" smtClean="0"/>
           </a:p>
           <a:p>
             <a:endParaRPr lang="en-US" dirty="0" smtClean="0"/>
@@ -24917,6 +24872,30 @@
           <a:xfrm>
             <a:off x="2328444" y="2801624"/>
             <a:ext cx="7315200" cy="3495675"/>
+          </a:xfrm>
+          <a:prstGeom prst="rect">
+            <a:avLst/>
+          </a:prstGeom>
+        </p:spPr>
+      </p:pic>
+      <p:pic>
+        <p:nvPicPr>
+          <p:cNvPr id="4" name="Picture 3"/>
+          <p:cNvPicPr>
+            <a:picLocks noChangeAspect="1"/>
+          </p:cNvPicPr>
+          <p:nvPr/>
+        </p:nvPicPr>
+        <p:blipFill>
+          <a:blip r:embed="rId3"/>
+          <a:stretch>
+            <a:fillRect/>
+          </a:stretch>
+        </p:blipFill>
+        <p:spPr>
+          <a:xfrm>
+            <a:off x="6348949" y="2801624"/>
+            <a:ext cx="5327437" cy="2667403"/>
           </a:xfrm>
           <a:prstGeom prst="rect">
             <a:avLst/>

</xml_diff>

<commit_message>
final version of the presentation (T-52 minutes).
</commit_message>
<xml_diff>
--- a/Modeling latency in a communication network.pptx
+++ b/Modeling latency in a communication network.pptx
@@ -23402,7 +23402,7 @@
         </p:spPr>
         <p:txBody>
           <a:bodyPr>
-            <a:normAutofit/>
+            <a:normAutofit lnSpcReduction="10000"/>
           </a:bodyPr>
           <a:lstStyle/>
           <a:p>
@@ -23496,7 +23496,15 @@
             <a:pPr lvl="1"/>
             <a:r>
               <a:rPr lang="en-US" dirty="0" smtClean="0"/>
-              <a:t>The RTT distribution is long-tailed but not heavy tailed i.e. the very small percentage of packets experiencing very large delays is probably not very important. Consider alternate models (like Gaussian Mixture Models) to model portions of the distribution containing 95% of the mass.</a:t>
+              <a:t>The RTT distribution is long-tailed but not heavy tailed i.e. the very small percentage of packets experiencing very large delays is probably not very important. Consider alternate models (like Gaussian Mixture Models) to model portions of the distribution containing 95% of the mass</a:t>
+            </a:r>
+            <a:r>
+              <a:rPr lang="en-US" dirty="0" smtClean="0"/>
+              <a:t>. </a:t>
+            </a:r>
+            <a:r>
+              <a:rPr lang="en-US" dirty="0" smtClean="0"/>
+              <a:t>Another alternative is to consider a bounded Pareto distribution where both lower and upper bounds are defined.</a:t>
             </a:r>
             <a:endParaRPr lang="en-US" dirty="0"/>
           </a:p>
@@ -23513,6 +23521,60 @@
             <a:endParaRPr lang="en-US" sz="1600" dirty="0" smtClean="0"/>
           </a:p>
           <a:p>
+            <a:endParaRPr lang="en-US" dirty="0"/>
+          </a:p>
+        </p:txBody>
+      </p:sp>
+      <p:sp>
+        <p:nvSpPr>
+          <p:cNvPr id="4" name="Rounded Rectangle 3"/>
+          <p:cNvSpPr/>
+          <p:nvPr/>
+        </p:nvSpPr>
+        <p:spPr>
+          <a:xfrm>
+            <a:off x="1192697" y="1709530"/>
+            <a:ext cx="9024730" cy="375301"/>
+          </a:xfrm>
+          <a:prstGeom prst="roundRect">
+            <a:avLst/>
+          </a:prstGeom>
+        </p:spPr>
+        <p:style>
+          <a:lnRef idx="2">
+            <a:schemeClr val="accent1">
+              <a:shade val="50000"/>
+            </a:schemeClr>
+          </a:lnRef>
+          <a:fillRef idx="1">
+            <a:schemeClr val="accent1"/>
+          </a:fillRef>
+          <a:effectRef idx="0">
+            <a:schemeClr val="accent1"/>
+          </a:effectRef>
+          <a:fontRef idx="minor">
+            <a:schemeClr val="lt1"/>
+          </a:fontRef>
+        </p:style>
+        <p:txBody>
+          <a:bodyPr rtlCol="0" anchor="ctr"/>
+          <a:lstStyle/>
+          <a:p>
+            <a:pPr algn="ctr"/>
+            <a:r>
+              <a:rPr lang="en-US" dirty="0" smtClean="0"/>
+              <a:t>All code, paper and this presentation </a:t>
+            </a:r>
+            <a:r>
+              <a:rPr lang="en-US" dirty="0"/>
+              <a:t>are available at </a:t>
+            </a:r>
+            <a:r>
+              <a:rPr lang="en-US" dirty="0">
+                <a:hlinkClick r:id="rId2"/>
+              </a:rPr>
+              <a:t>https://github.com/aarora79/rttmodelR</a:t>
+            </a:r>
             <a:endParaRPr lang="en-US" dirty="0"/>
           </a:p>
         </p:txBody>

</xml_diff>